<commit_message>
Create initial slide in powerpoint for Go video 6
</commit_message>
<xml_diff>
--- a/For_loops_slices_conditionals/loops_conditionals_slices.pptx
+++ b/For_loops_slices_conditionals/loops_conditionals_slices.pptx
@@ -3378,7 +3378,10 @@
           <a:bodyPr/>
           <a:lstStyle/>
           <a:p>
-            <a:endParaRPr lang="en-US"/>
+            <a:r>
+              <a:rPr lang="en-US" dirty="0"/>
+              <a:t>Looping, conditionals, and slices</a:t>
+            </a:r>
           </a:p>
         </p:txBody>
       </p:sp>
@@ -3403,10 +3406,43 @@
           <a:bodyPr/>
           <a:lstStyle/>
           <a:p>
-            <a:endParaRPr lang="en-US"/>
-          </a:p>
-        </p:txBody>
-      </p:sp>
+            <a:r>
+              <a:rPr lang="en-US" dirty="0"/>
+              <a:t>Kevin Lin</a:t>
+            </a:r>
+          </a:p>
+        </p:txBody>
+      </p:sp>
+      <p:pic>
+        <p:nvPicPr>
+          <p:cNvPr id="5" name="Picture 4">
+            <a:extLst>
+              <a:ext uri="{FF2B5EF4-FFF2-40B4-BE49-F238E27FC236}">
+                <a16:creationId xmlns:a16="http://schemas.microsoft.com/office/drawing/2014/main" id="{A05A37E0-E0E1-4D48-91E9-FA438B95FD73}"/>
+              </a:ext>
+            </a:extLst>
+          </p:cNvPr>
+          <p:cNvPicPr>
+            <a:picLocks noChangeAspect="1"/>
+          </p:cNvPicPr>
+          <p:nvPr/>
+        </p:nvPicPr>
+        <p:blipFill>
+          <a:blip r:embed="rId2"/>
+          <a:stretch>
+            <a:fillRect/>
+          </a:stretch>
+        </p:blipFill>
+        <p:spPr>
+          <a:xfrm>
+            <a:off x="6811488" y="3716977"/>
+            <a:ext cx="2286000" cy="2286000"/>
+          </a:xfrm>
+          <a:prstGeom prst="rect">
+            <a:avLst/>
+          </a:prstGeom>
+        </p:spPr>
+      </p:pic>
     </p:spTree>
     <p:extLst>
       <p:ext uri="{BB962C8B-B14F-4D97-AF65-F5344CB8AC3E}">

</xml_diff>

<commit_message>
Add extra slide for continue and break keywords
</commit_message>
<xml_diff>
--- a/For_loops_slices_conditionals/loops_conditionals_slices.pptx
+++ b/For_loops_slices_conditionals/loops_conditionals_slices.pptx
@@ -9,6 +9,7 @@
     <p:sldId id="257" r:id="rId3"/>
     <p:sldId id="258" r:id="rId4"/>
     <p:sldId id="259" r:id="rId5"/>
+    <p:sldId id="260" r:id="rId6"/>
   </p:sldIdLst>
   <p:sldSz cx="12192000" cy="6858000"/>
   <p:notesSz cx="6858000" cy="9144000"/>
@@ -15993,6 +15994,125 @@
 </p:sld>
 </file>
 
+<file path=ppt/slides/slide5.xml><?xml version="1.0" encoding="utf-8"?>
+<p:sld xmlns:a="http://schemas.openxmlformats.org/drawingml/2006/main" xmlns:r="http://schemas.openxmlformats.org/officeDocument/2006/relationships" xmlns:p="http://schemas.openxmlformats.org/presentationml/2006/main">
+  <p:cSld>
+    <p:spTree>
+      <p:nvGrpSpPr>
+        <p:cNvPr id="1" name=""/>
+        <p:cNvGrpSpPr/>
+        <p:nvPr/>
+      </p:nvGrpSpPr>
+      <p:grpSpPr>
+        <a:xfrm>
+          <a:off x="0" y="0"/>
+          <a:ext cx="0" cy="0"/>
+          <a:chOff x="0" y="0"/>
+          <a:chExt cx="0" cy="0"/>
+        </a:xfrm>
+      </p:grpSpPr>
+      <p:sp>
+        <p:nvSpPr>
+          <p:cNvPr id="2" name="Title 1">
+            <a:extLst>
+              <a:ext uri="{FF2B5EF4-FFF2-40B4-BE49-F238E27FC236}">
+                <a16:creationId xmlns:a16="http://schemas.microsoft.com/office/drawing/2014/main" id="{F842B562-C342-4C89-BF91-2B170AFC5D8C}"/>
+              </a:ext>
+            </a:extLst>
+          </p:cNvPr>
+          <p:cNvSpPr>
+            <a:spLocks noGrp="1"/>
+          </p:cNvSpPr>
+          <p:nvPr>
+            <p:ph type="title"/>
+          </p:nvPr>
+        </p:nvSpPr>
+        <p:spPr/>
+        <p:txBody>
+          <a:bodyPr/>
+          <a:lstStyle/>
+          <a:p>
+            <a:r>
+              <a:rPr lang="en-US" dirty="0"/>
+              <a:t>Extra content</a:t>
+            </a:r>
+          </a:p>
+        </p:txBody>
+      </p:sp>
+      <p:sp>
+        <p:nvSpPr>
+          <p:cNvPr id="3" name="Content Placeholder 2">
+            <a:extLst>
+              <a:ext uri="{FF2B5EF4-FFF2-40B4-BE49-F238E27FC236}">
+                <a16:creationId xmlns:a16="http://schemas.microsoft.com/office/drawing/2014/main" id="{7FD28A09-3D02-449E-827E-7153D025EB52}"/>
+              </a:ext>
+            </a:extLst>
+          </p:cNvPr>
+          <p:cNvSpPr>
+            <a:spLocks noGrp="1"/>
+          </p:cNvSpPr>
+          <p:nvPr>
+            <p:ph idx="1"/>
+          </p:nvPr>
+        </p:nvSpPr>
+        <p:spPr/>
+        <p:txBody>
+          <a:bodyPr/>
+          <a:lstStyle/>
+          <a:p>
+            <a:r>
+              <a:rPr lang="en-US" dirty="0"/>
+              <a:t>Keywords:</a:t>
+            </a:r>
+          </a:p>
+          <a:p>
+            <a:pPr lvl="1"/>
+            <a:r>
+              <a:rPr lang="en-US" dirty="0"/>
+              <a:t>Continue –</a:t>
+            </a:r>
+          </a:p>
+          <a:p>
+            <a:pPr lvl="2"/>
+            <a:r>
+              <a:rPr lang="en-US" dirty="0"/>
+              <a:t>Terminate the current iteration and go to the next iteration.</a:t>
+            </a:r>
+          </a:p>
+          <a:p>
+            <a:pPr lvl="1"/>
+            <a:r>
+              <a:rPr lang="en-US" dirty="0"/>
+              <a:t>Break –</a:t>
+            </a:r>
+          </a:p>
+          <a:p>
+            <a:pPr lvl="2"/>
+            <a:r>
+              <a:rPr lang="en-US" dirty="0"/>
+              <a:t>Exit the whole loop and go to </a:t>
+            </a:r>
+            <a:r>
+              <a:rPr lang="en-US"/>
+              <a:t>the next line of code.</a:t>
+            </a:r>
+            <a:endParaRPr lang="en-US" dirty="0"/>
+          </a:p>
+        </p:txBody>
+      </p:sp>
+    </p:spTree>
+    <p:extLst>
+      <p:ext uri="{BB962C8B-B14F-4D97-AF65-F5344CB8AC3E}">
+        <p14:creationId xmlns:p14="http://schemas.microsoft.com/office/powerpoint/2010/main" val="4290475966"/>
+      </p:ext>
+    </p:extLst>
+  </p:cSld>
+  <p:clrMapOvr>
+    <a:masterClrMapping/>
+  </p:clrMapOvr>
+</p:sld>
+</file>
+
 <file path=ppt/theme/theme1.xml><?xml version="1.0" encoding="utf-8"?>
 <a:theme xmlns:a="http://schemas.openxmlformats.org/drawingml/2006/main" name="Frame">
   <a:themeElements>

</xml_diff>

<commit_message>
Bold text on extra content slide
</commit_message>
<xml_diff>
--- a/For_loops_slices_conditionals/loops_conditionals_slices.pptx
+++ b/For_loops_slices_conditionals/loops_conditionals_slices.pptx
@@ -16061,15 +16061,23 @@
           <a:lstStyle/>
           <a:p>
             <a:r>
+              <a:rPr lang="en-US" b="1" dirty="0"/>
+              <a:t>Keywords</a:t>
+            </a:r>
+            <a:r>
               <a:rPr lang="en-US" dirty="0"/>
-              <a:t>Keywords:</a:t>
+              <a:t>:</a:t>
             </a:r>
           </a:p>
           <a:p>
             <a:pPr lvl="1"/>
             <a:r>
+              <a:rPr lang="en-US" b="1" dirty="0"/>
+              <a:t>Continue</a:t>
+            </a:r>
+            <a:r>
               <a:rPr lang="en-US" dirty="0"/>
-              <a:t>Continue –</a:t>
+              <a:t> –</a:t>
             </a:r>
           </a:p>
           <a:p>
@@ -16082,21 +16090,20 @@
           <a:p>
             <a:pPr lvl="1"/>
             <a:r>
+              <a:rPr lang="en-US" b="1" dirty="0"/>
+              <a:t>Break</a:t>
+            </a:r>
+            <a:r>
               <a:rPr lang="en-US" dirty="0"/>
-              <a:t>Break –</a:t>
+              <a:t> –</a:t>
             </a:r>
           </a:p>
           <a:p>
             <a:pPr lvl="2"/>
             <a:r>
               <a:rPr lang="en-US" dirty="0"/>
-              <a:t>Exit the whole loop and go to </a:t>
+              <a:t>Exit the whole loop and go to the next line of code.</a:t>
             </a:r>
-            <a:r>
-              <a:rPr lang="en-US"/>
-              <a:t>the next line of code.</a:t>
-            </a:r>
-            <a:endParaRPr lang="en-US" dirty="0"/>
           </a:p>
         </p:txBody>
       </p:sp>

</xml_diff>